<commit_message>
update S2, t2 CAMspiracy
</commit_message>
<xml_diff>
--- a/Studies/S2_softRobots/t2_CAMs/pre_CAM/static/CAMinst/CAMEL_Instrunctions_DE_noArrows_long_S2.pptx
+++ b/Studies/S2_softRobots/t2_CAMs/pre_CAM/static/CAMinst/CAMEL_Instrunctions_DE_noArrows_long_S2.pptx
@@ -5680,7 +5680,7 @@
           <a:p>
             <a:r>
               <a:rPr lang="de-DE" sz="2800" dirty="0"/>
-              <a:t>In dieser Studie bitten wir Sie, in einer Art Mind-Map Ihre Gedanken, Gefühle und Einschätzungen zu den Vorteilen und Risiken von einem sozialen Assistenzroboter. </a:t>
+              <a:t>In dieser Studie bitten wir Sie, in einer Art Mind-Map Ihre Gedanken, Gefühle und Einschätzungen zu den Vorteilen und Nachteilen von einem sozialen Assistenzroboter darzustellen.</a:t>
             </a:r>
           </a:p>
           <a:p>
@@ -10464,15 +10464,19 @@
           <a:p>
             <a:r>
               <a:rPr lang="de-DE" sz="2800" dirty="0"/>
-              <a:t>In dieser Studie bitten wir Sie, in einer Art Mind-Map Ihre Gedanken, Gefühle und Einschätzungen zu den Vorteilen und Risiken von einem </a:t>
+              <a:t>In dieser Studie bitten wir Sie, in einer Art Mind-Map Ihre Gedanken, Gefühle und Einschätzungen zu den Vorteilen und Nachteilen von einem </a:t>
             </a:r>
             <a:r>
               <a:rPr lang="en-US" sz="2800" dirty="0" err="1"/>
               <a:t>Rettungsroboter</a:t>
             </a:r>
             <a:r>
+              <a:rPr lang="en-US" sz="2800" dirty="0"/>
+              <a:t> </a:t>
+            </a:r>
+            <a:r>
               <a:rPr lang="de-DE" sz="2800" dirty="0"/>
-              <a:t>. </a:t>
+              <a:t>darzustellen. </a:t>
             </a:r>
           </a:p>
           <a:p>

</xml_diff>